<commit_message>
Add Informarion about dataset in presentation
</commit_message>
<xml_diff>
--- a/Resources/Housing Price Predictions.pptx
+++ b/Resources/Housing Price Predictions.pptx
@@ -9511,10 +9511,10 @@
               <a:buNone/>
             </a:pPr>
             <a:r>
-              <a:rPr lang="en-GB"/>
-              <a:t>Purpose1</a:t>
+              <a:rPr lang="en-GB" dirty="0"/>
+              <a:t>Purpose</a:t>
             </a:r>
-            <a:endParaRPr/>
+            <a:endParaRPr dirty="0"/>
           </a:p>
         </p:txBody>
       </p:sp>

</xml_diff>